<commit_message>
Ajout diapo final sprint review
</commit_message>
<xml_diff>
--- a/doc/Gitus_project_sprint_1.pptx
+++ b/doc/Gitus_project_sprint_1.pptx
@@ -5,7 +5,7 @@
     <p:sldMasterId id="2147483800" r:id="rId1"/>
   </p:sldMasterIdLst>
   <p:notesMasterIdLst>
-    <p:notesMasterId r:id="rId28"/>
+    <p:notesMasterId r:id="rId27"/>
   </p:notesMasterIdLst>
   <p:sldIdLst>
     <p:sldId id="746" r:id="rId2"/>
@@ -21,19 +21,18 @@
     <p:sldId id="763" r:id="rId12"/>
     <p:sldId id="828" r:id="rId13"/>
     <p:sldId id="829" r:id="rId14"/>
-    <p:sldId id="830" r:id="rId15"/>
-    <p:sldId id="783" r:id="rId16"/>
-    <p:sldId id="755" r:id="rId17"/>
-    <p:sldId id="823" r:id="rId18"/>
-    <p:sldId id="827" r:id="rId19"/>
-    <p:sldId id="825" r:id="rId20"/>
-    <p:sldId id="826" r:id="rId21"/>
-    <p:sldId id="822" r:id="rId22"/>
-    <p:sldId id="756" r:id="rId23"/>
-    <p:sldId id="824" r:id="rId24"/>
-    <p:sldId id="779" r:id="rId25"/>
-    <p:sldId id="760" r:id="rId26"/>
-    <p:sldId id="766" r:id="rId27"/>
+    <p:sldId id="783" r:id="rId15"/>
+    <p:sldId id="755" r:id="rId16"/>
+    <p:sldId id="823" r:id="rId17"/>
+    <p:sldId id="827" r:id="rId18"/>
+    <p:sldId id="825" r:id="rId19"/>
+    <p:sldId id="826" r:id="rId20"/>
+    <p:sldId id="822" r:id="rId21"/>
+    <p:sldId id="756" r:id="rId22"/>
+    <p:sldId id="824" r:id="rId23"/>
+    <p:sldId id="779" r:id="rId24"/>
+    <p:sldId id="760" r:id="rId25"/>
+    <p:sldId id="766" r:id="rId26"/>
   </p:sldIdLst>
   <p:sldSz cx="9144000" cy="5143500" type="screen16x9"/>
   <p:notesSz cx="6805613" cy="9944100"/>
@@ -3308,7 +3307,7 @@
         <a:p>
           <a:r>
             <a:rPr lang="fr-FR" b="1" dirty="0" smtClean="0"/>
-            <a:t>A définir</a:t>
+            <a:t>16 décembre ??</a:t>
           </a:r>
           <a:endParaRPr lang="fr-FR" b="1" dirty="0"/>
         </a:p>
@@ -3421,6 +3420,43 @@
         </a:p>
       </dgm:t>
     </dgm:pt>
+    <dgm:pt modelId="{58D801B0-4764-4E71-93E4-598BDD3A52DF}">
+      <dgm:prSet/>
+      <dgm:spPr/>
+      <dgm:t>
+        <a:bodyPr/>
+        <a:lstStyle/>
+        <a:p>
+          <a:r>
+            <a:rPr lang="fr-FR" b="1" dirty="0" smtClean="0"/>
+            <a:t>20 janvier</a:t>
+          </a:r>
+          <a:endParaRPr lang="fr-FR" b="1" dirty="0"/>
+        </a:p>
+      </dgm:t>
+    </dgm:pt>
+    <dgm:pt modelId="{C293F768-0EFA-48A1-AE8D-A84A259D4AF3}" type="parTrans" cxnId="{6C9DC41F-8AE8-484B-84B6-21572FA8BC72}">
+      <dgm:prSet/>
+      <dgm:spPr/>
+      <dgm:t>
+        <a:bodyPr/>
+        <a:lstStyle/>
+        <a:p>
+          <a:endParaRPr lang="fr-FR"/>
+        </a:p>
+      </dgm:t>
+    </dgm:pt>
+    <dgm:pt modelId="{D9215B78-2062-427F-8410-C9894F31A452}" type="sibTrans" cxnId="{6C9DC41F-8AE8-484B-84B6-21572FA8BC72}">
+      <dgm:prSet/>
+      <dgm:spPr/>
+      <dgm:t>
+        <a:bodyPr/>
+        <a:lstStyle/>
+        <a:p>
+          <a:endParaRPr lang="fr-FR"/>
+        </a:p>
+      </dgm:t>
+    </dgm:pt>
     <dgm:pt modelId="{ACB506F7-01B8-44AF-B6E1-5C36ECD5A098}">
       <dgm:prSet/>
       <dgm:spPr>
@@ -3438,17 +3474,6 @@
         </a:p>
       </dgm:t>
     </dgm:pt>
-    <dgm:pt modelId="{C9889A6D-9782-450D-8A79-01F47F55434E}" type="parTrans" cxnId="{DE1C2D1C-6D36-4EC1-BE79-C1AE0162E423}">
-      <dgm:prSet/>
-      <dgm:spPr/>
-      <dgm:t>
-        <a:bodyPr/>
-        <a:lstStyle/>
-        <a:p>
-          <a:endParaRPr lang="fr-FR"/>
-        </a:p>
-      </dgm:t>
-    </dgm:pt>
     <dgm:pt modelId="{C0A280D5-4B38-4A21-B2CA-1AB62A59F98B}" type="sibTrans" cxnId="{DE1C2D1C-6D36-4EC1-BE79-C1AE0162E423}">
       <dgm:prSet/>
       <dgm:spPr/>
@@ -3460,33 +3485,7 @@
         </a:p>
       </dgm:t>
     </dgm:pt>
-    <dgm:pt modelId="{58D801B0-4764-4E71-93E4-598BDD3A52DF}">
-      <dgm:prSet/>
-      <dgm:spPr/>
-      <dgm:t>
-        <a:bodyPr/>
-        <a:lstStyle/>
-        <a:p>
-          <a:r>
-            <a:rPr lang="fr-FR" b="1" smtClean="0"/>
-            <a:t>A définir</a:t>
-          </a:r>
-          <a:endParaRPr lang="fr-FR" b="1" dirty="0"/>
-        </a:p>
-      </dgm:t>
-    </dgm:pt>
-    <dgm:pt modelId="{C293F768-0EFA-48A1-AE8D-A84A259D4AF3}" type="parTrans" cxnId="{6C9DC41F-8AE8-484B-84B6-21572FA8BC72}">
-      <dgm:prSet/>
-      <dgm:spPr/>
-      <dgm:t>
-        <a:bodyPr/>
-        <a:lstStyle/>
-        <a:p>
-          <a:endParaRPr lang="fr-FR"/>
-        </a:p>
-      </dgm:t>
-    </dgm:pt>
-    <dgm:pt modelId="{D9215B78-2062-427F-8410-C9894F31A452}" type="sibTrans" cxnId="{6C9DC41F-8AE8-484B-84B6-21572FA8BC72}">
+    <dgm:pt modelId="{C9889A6D-9782-450D-8A79-01F47F55434E}" type="parTrans" cxnId="{DE1C2D1C-6D36-4EC1-BE79-C1AE0162E423}">
       <dgm:prSet/>
       <dgm:spPr/>
       <dgm:t>
@@ -5324,7 +5323,7 @@
           </a:pPr>
           <a:r>
             <a:rPr lang="fr-FR" sz="1600" b="1" kern="1200" dirty="0" smtClean="0"/>
-            <a:t>A définir</a:t>
+            <a:t>16 décembre ??</a:t>
           </a:r>
           <a:endParaRPr lang="fr-FR" sz="1600" b="1" kern="1200" dirty="0"/>
         </a:p>
@@ -5477,8 +5476,8 @@
             <a:buChar char="••"/>
           </a:pPr>
           <a:r>
-            <a:rPr lang="fr-FR" sz="1600" b="1" kern="1200" smtClean="0"/>
-            <a:t>A définir</a:t>
+            <a:rPr lang="fr-FR" sz="1600" b="1" kern="1200" dirty="0" smtClean="0"/>
+            <a:t>20 janvier</a:t>
           </a:r>
           <a:endParaRPr lang="fr-FR" sz="1600" b="1" kern="1200" dirty="0"/>
         </a:p>
@@ -12040,7 +12039,7 @@
           <a:p>
             <a:fld id="{E005150F-492C-4A70-8D16-A7DF79340EA9}" type="datetimeFigureOut">
               <a:rPr lang="fr-FR" smtClean="0"/>
-              <a:t>14/11/2019</a:t>
+              <a:t>18/11/2019</a:t>
             </a:fld>
             <a:endParaRPr lang="fr-FR"/>
           </a:p>
@@ -12718,7 +12717,7 @@
     </p:spTree>
     <p:extLst>
       <p:ext uri="{BB962C8B-B14F-4D97-AF65-F5344CB8AC3E}">
-        <p14:creationId xmlns:p14="http://schemas.microsoft.com/office/powerpoint/2010/main" val="2411617550"/>
+        <p14:creationId xmlns:p14="http://schemas.microsoft.com/office/powerpoint/2010/main" val="721986858"/>
       </p:ext>
     </p:extLst>
   </p:cSld>
@@ -12729,90 +12728,6 @@
 </file>
 
 <file path=ppt/notesSlides/notesSlide6.xml><?xml version="1.0" encoding="utf-8"?>
-<p:notes xmlns:a="http://schemas.openxmlformats.org/drawingml/2006/main" xmlns:r="http://schemas.openxmlformats.org/officeDocument/2006/relationships" xmlns:p="http://schemas.openxmlformats.org/presentationml/2006/main">
-  <p:cSld>
-    <p:spTree>
-      <p:nvGrpSpPr>
-        <p:cNvPr id="1" name=""/>
-        <p:cNvGrpSpPr/>
-        <p:nvPr/>
-      </p:nvGrpSpPr>
-      <p:grpSpPr>
-        <a:xfrm>
-          <a:off x="0" y="0"/>
-          <a:ext cx="0" cy="0"/>
-          <a:chOff x="0" y="0"/>
-          <a:chExt cx="0" cy="0"/>
-        </a:xfrm>
-      </p:grpSpPr>
-      <p:sp>
-        <p:nvSpPr>
-          <p:cNvPr id="2" name="Espace réservé de l'image des diapositives 1"/>
-          <p:cNvSpPr>
-            <a:spLocks noGrp="1" noRot="1" noChangeAspect="1"/>
-          </p:cNvSpPr>
-          <p:nvPr>
-            <p:ph type="sldImg"/>
-          </p:nvPr>
-        </p:nvSpPr>
-        <p:spPr/>
-      </p:sp>
-      <p:sp>
-        <p:nvSpPr>
-          <p:cNvPr id="3" name="Espace réservé des commentaires 2"/>
-          <p:cNvSpPr>
-            <a:spLocks noGrp="1"/>
-          </p:cNvSpPr>
-          <p:nvPr>
-            <p:ph type="body" idx="1"/>
-          </p:nvPr>
-        </p:nvSpPr>
-        <p:spPr/>
-        <p:txBody>
-          <a:bodyPr/>
-          <a:lstStyle/>
-          <a:p>
-            <a:endParaRPr lang="fr-FR"/>
-          </a:p>
-        </p:txBody>
-      </p:sp>
-      <p:sp>
-        <p:nvSpPr>
-          <p:cNvPr id="4" name="Espace réservé du numéro de diapositive 3"/>
-          <p:cNvSpPr>
-            <a:spLocks noGrp="1"/>
-          </p:cNvSpPr>
-          <p:nvPr>
-            <p:ph type="sldNum" sz="quarter" idx="10"/>
-          </p:nvPr>
-        </p:nvSpPr>
-        <p:spPr/>
-        <p:txBody>
-          <a:bodyPr/>
-          <a:lstStyle/>
-          <a:p>
-            <a:fld id="{E0356903-A611-4A14-BE6B-A85F8FB3C319}" type="slidenum">
-              <a:rPr lang="fr-FR" smtClean="0"/>
-              <a:t>15</a:t>
-            </a:fld>
-            <a:endParaRPr lang="fr-FR"/>
-          </a:p>
-        </p:txBody>
-      </p:sp>
-    </p:spTree>
-    <p:extLst>
-      <p:ext uri="{BB962C8B-B14F-4D97-AF65-F5344CB8AC3E}">
-        <p14:creationId xmlns:p14="http://schemas.microsoft.com/office/powerpoint/2010/main" val="721986858"/>
-      </p:ext>
-    </p:extLst>
-  </p:cSld>
-  <p:clrMapOvr>
-    <a:masterClrMapping/>
-  </p:clrMapOvr>
-</p:notes>
-</file>
-
-<file path=ppt/notesSlides/notesSlide7.xml><?xml version="1.0" encoding="utf-8"?>
 <p:notes xmlns:a="http://schemas.openxmlformats.org/drawingml/2006/main" xmlns:r="http://schemas.openxmlformats.org/officeDocument/2006/relationships" xmlns:p="http://schemas.openxmlformats.org/presentationml/2006/main">
   <p:cSld>
     <p:spTree>
@@ -12877,7 +12792,7 @@
           <a:p>
             <a:fld id="{E0356903-A611-4A14-BE6B-A85F8FB3C319}" type="slidenum">
               <a:rPr lang="fr-FR" smtClean="0"/>
-              <a:t>26</a:t>
+              <a:t>25</a:t>
             </a:fld>
             <a:endParaRPr lang="fr-FR"/>
           </a:p>
@@ -16827,11 +16742,7 @@
           <a:p>
             <a:r>
               <a:rPr lang="fr-FR" dirty="0" smtClean="0"/>
-              <a:t>Nous nous étions engagé sur </a:t>
-            </a:r>
-            <a:r>
-              <a:rPr lang="fr-FR" dirty="0" smtClean="0"/>
-              <a:t>39 points</a:t>
+              <a:t>Nous nous étions engagé sur 39 points</a:t>
             </a:r>
             <a:endParaRPr lang="fr-FR" dirty="0"/>
           </a:p>
@@ -17064,13 +16975,6 @@
                         </a:rPr>
                         <a:t>Spécification de l'architecture d'un projet</a:t>
                       </a:r>
-                      <a:endParaRPr lang="fr-FR" sz="1200" b="0" i="0" u="none" strike="noStrike" dirty="0" smtClean="0">
-                        <a:solidFill>
-                          <a:srgbClr val="000000"/>
-                        </a:solidFill>
-                        <a:effectLst/>
-                        <a:latin typeface="Arial"/>
-                      </a:endParaRPr>
                     </a:p>
                   </a:txBody>
                   <a:tcPr marL="7620" marR="7620" marT="7620" marB="0" anchor="b"/>
@@ -17141,13 +17045,6 @@
                         </a:rPr>
                         <a:t>Création de la base de données</a:t>
                       </a:r>
-                      <a:endParaRPr lang="fr-FR" sz="1200" b="0" i="0" u="none" strike="noStrike" dirty="0" smtClean="0">
-                        <a:solidFill>
-                          <a:srgbClr val="000000"/>
-                        </a:solidFill>
-                        <a:effectLst/>
-                        <a:latin typeface="Arial"/>
-                      </a:endParaRPr>
                     </a:p>
                   </a:txBody>
                   <a:tcPr marL="7620" marR="7620" marT="7620" marB="0" anchor="b"/>
@@ -17184,13 +17081,6 @@
                         </a:rPr>
                         <a:t>13</a:t>
                       </a:r>
-                      <a:endParaRPr lang="fr-FR" sz="1200" b="0" i="0" u="none" strike="noStrike" dirty="0" smtClean="0">
-                        <a:solidFill>
-                          <a:srgbClr val="000000"/>
-                        </a:solidFill>
-                        <a:effectLst/>
-                        <a:latin typeface="Arial"/>
-                      </a:endParaRPr>
                     </a:p>
                   </a:txBody>
                   <a:tcPr marL="7620" marR="7620" marT="7620" marB="0" anchor="b"/>
@@ -17234,6 +17124,13 @@
                         </a:rPr>
                         <a:t>Gestion de l'affichage des données</a:t>
                       </a:r>
+                      <a:endParaRPr lang="fr-FR" sz="1200" b="0" i="0" u="none" strike="noStrike" dirty="0" smtClean="0">
+                        <a:solidFill>
+                          <a:srgbClr val="000000"/>
+                        </a:solidFill>
+                        <a:effectLst/>
+                        <a:latin typeface="Arial"/>
+                      </a:endParaRPr>
                     </a:p>
                   </a:txBody>
                   <a:tcPr marL="7620" marR="7620" marT="7620" marB="0" anchor="b"/>
@@ -17862,15 +17759,7 @@
           <a:p>
             <a:r>
               <a:rPr lang="fr-FR" dirty="0" smtClean="0"/>
-              <a:t>Bilan - Nous avons réalisé…  </a:t>
-            </a:r>
-            <a:r>
-              <a:rPr lang="fr-FR" dirty="0" smtClean="0"/>
-              <a:t>31 </a:t>
-            </a:r>
-            <a:r>
-              <a:rPr lang="fr-FR" dirty="0" smtClean="0"/>
-              <a:t>points</a:t>
+              <a:t>Bilan - Nous avons réalisé…  31 points</a:t>
             </a:r>
             <a:endParaRPr lang="fr-FR" dirty="0"/>
           </a:p>
@@ -18012,17 +17901,7 @@
                           <a:effectLst/>
                           <a:latin typeface="Arial"/>
                         </a:rPr>
-                        <a:t>Spécification de l'architecture d'un </a:t>
-                      </a:r>
-                      <a:r>
-                        <a:rPr lang="fr-FR" sz="1200" b="0" i="0" u="none" strike="noStrike" dirty="0" smtClean="0">
-                          <a:solidFill>
-                            <a:srgbClr val="000000"/>
-                          </a:solidFill>
-                          <a:effectLst/>
-                          <a:latin typeface="Arial"/>
-                        </a:rPr>
-                        <a:t>projet</a:t>
+                        <a:t>Spécification de l'architecture d'un projet</a:t>
                       </a:r>
                     </a:p>
                   </a:txBody>
@@ -18209,13 +18088,6 @@
                         </a:rPr>
                         <a:t>8</a:t>
                       </a:r>
-                      <a:endParaRPr lang="fr-FR" sz="1200" b="0" i="0" u="none" strike="noStrike" dirty="0" smtClean="0">
-                        <a:solidFill>
-                          <a:srgbClr val="000000"/>
-                        </a:solidFill>
-                        <a:effectLst/>
-                        <a:latin typeface="Arial"/>
-                      </a:endParaRPr>
                     </a:p>
                   </a:txBody>
                   <a:tcPr marL="7620" marR="7620" marT="7620" marB="0" anchor="b">
@@ -18865,7 +18737,7 @@
         </p:spPr>
         <p:txBody>
           <a:bodyPr>
-            <a:normAutofit/>
+            <a:normAutofit lnSpcReduction="10000"/>
           </a:bodyPr>
           <a:lstStyle/>
           <a:p>
@@ -18890,11 +18762,7 @@
             </a:r>
             <a:r>
               <a:rPr lang="fr-FR" dirty="0" smtClean="0"/>
-              <a:t> </a:t>
-            </a:r>
-            <a:r>
-              <a:rPr lang="fr-FR" dirty="0" smtClean="0"/>
-              <a:t>:</a:t>
+              <a:t> :</a:t>
             </a:r>
           </a:p>
           <a:p>
@@ -18910,7 +18778,6 @@
               <a:rPr lang="fr-FR" dirty="0" smtClean="0"/>
               <a:t>Réalisation d’un diagramme type UML</a:t>
             </a:r>
-            <a:endParaRPr lang="fr-FR" dirty="0" smtClean="0"/>
           </a:p>
           <a:p>
             <a:pPr lvl="2"/>
@@ -18918,7 +18785,6 @@
               <a:rPr lang="fr-FR" dirty="0" smtClean="0"/>
               <a:t>Implémentation de l’architecture en GO</a:t>
             </a:r>
-            <a:endParaRPr lang="fr-FR" dirty="0" smtClean="0"/>
           </a:p>
           <a:p>
             <a:endParaRPr lang="fr-FR" dirty="0" smtClean="0"/>
@@ -18951,11 +18817,6 @@
               </a:rPr>
               <a:t>Architecture basique qui répond aux exigences du projet</a:t>
             </a:r>
-            <a:endParaRPr lang="fr-FR" dirty="0" smtClean="0">
-              <a:solidFill>
-                <a:srgbClr val="008000"/>
-              </a:solidFill>
-            </a:endParaRPr>
           </a:p>
           <a:p>
             <a:pPr lvl="1"/>
@@ -18995,7 +18856,18 @@
             <a:pPr lvl="1"/>
             <a:r>
               <a:rPr lang="fr-FR" dirty="0" smtClean="0"/>
-              <a:t>Evolution probable de l’architecture lors des prochains sprints pour répondre à de nouvelles problématiques</a:t>
+              <a:t>Evolution probable de l’architecture lors des prochains sprints pour répondre à de nouvelles </a:t>
+            </a:r>
+            <a:r>
+              <a:rPr lang="fr-FR" dirty="0" smtClean="0"/>
+              <a:t>problématiques</a:t>
+            </a:r>
+          </a:p>
+          <a:p>
+            <a:pPr lvl="1"/>
+            <a:r>
+              <a:rPr lang="fr-FR" dirty="0" smtClean="0"/>
+              <a:t>Mise à jour régulière de la spécification</a:t>
             </a:r>
             <a:endParaRPr lang="fr-FR" dirty="0" smtClean="0"/>
           </a:p>
@@ -19108,12 +18980,35 @@
               <a:t>Objectifs </a:t>
             </a:r>
             <a:r>
-              <a:rPr lang="fr-FR" dirty="0"/>
-              <a:t>:</a:t>
+              <a:rPr lang="fr-FR" dirty="0" smtClean="0"/>
+              <a:t>: </a:t>
             </a:r>
           </a:p>
           <a:p>
-            <a:pPr marL="134269" indent="0">
+            <a:pPr lvl="1"/>
+            <a:r>
+              <a:rPr lang="fr-FR" dirty="0" smtClean="0"/>
+              <a:t>Création des classes </a:t>
+            </a:r>
+            <a:r>
+              <a:rPr lang="fr-FR" dirty="0" err="1" smtClean="0"/>
+              <a:t>project</a:t>
+            </a:r>
+            <a:r>
+              <a:rPr lang="fr-FR" dirty="0" smtClean="0"/>
+              <a:t>, user story, </a:t>
+            </a:r>
+            <a:r>
+              <a:rPr lang="fr-FR" dirty="0" err="1" smtClean="0"/>
+              <a:t>task</a:t>
+            </a:r>
+            <a:r>
+              <a:rPr lang="fr-FR" dirty="0" smtClean="0"/>
+              <a:t> dans Go</a:t>
+            </a:r>
+          </a:p>
+          <a:p>
+            <a:pPr marL="268288" lvl="1" indent="0">
               <a:buNone/>
             </a:pPr>
             <a:endParaRPr lang="fr-FR" dirty="0" smtClean="0"/>
@@ -19133,27 +19028,24 @@
                   <a:srgbClr val="008000"/>
                 </a:solidFill>
               </a:rPr>
-              <a:t>OK/KO</a:t>
+              <a:t>OK</a:t>
             </a:r>
           </a:p>
           <a:p>
             <a:pPr lvl="1"/>
-            <a:r>
-              <a:rPr lang="fr-FR" dirty="0" err="1" smtClean="0">
-                <a:solidFill>
-                  <a:srgbClr val="008000"/>
-                </a:solidFill>
-              </a:rPr>
-              <a:t>Ressenti,satisfaction</a:t>
-            </a:r>
             <a:r>
               <a:rPr lang="fr-FR" dirty="0" smtClean="0">
                 <a:solidFill>
                   <a:srgbClr val="008000"/>
                 </a:solidFill>
               </a:rPr>
-              <a:t>, problématiques, état d’avancement si KO</a:t>
+              <a:t>Construction du modèle avec des paramètres minimaux</a:t>
             </a:r>
+            <a:endParaRPr lang="fr-FR" dirty="0" smtClean="0">
+              <a:solidFill>
+                <a:srgbClr val="008000"/>
+              </a:solidFill>
+            </a:endParaRPr>
           </a:p>
           <a:p>
             <a:pPr lvl="1"/>
@@ -19193,8 +19085,9 @@
             <a:pPr lvl="1"/>
             <a:r>
               <a:rPr lang="fr-FR" dirty="0" smtClean="0"/>
-              <a:t>Perspectives suite à la réalisation de l’US</a:t>
+              <a:t>Ajout de paramètres pour approfondir le modèle</a:t>
             </a:r>
+            <a:endParaRPr lang="fr-FR" dirty="0" smtClean="0"/>
           </a:p>
         </p:txBody>
       </p:sp>
@@ -19274,7 +19167,7 @@
                 </a:solidFill>
                 <a:latin typeface="Arial"/>
               </a:rPr>
-              <a:t>Gestion de l'affichage des données</a:t>
+              <a:t>Implémentation des fonctions d’interaction</a:t>
             </a:r>
           </a:p>
         </p:txBody>
@@ -19302,15 +19195,102 @@
           <a:p>
             <a:r>
               <a:rPr lang="fr-FR" dirty="0" smtClean="0"/>
-              <a:t>Objectifs </a:t>
-            </a:r>
-            <a:r>
-              <a:rPr lang="fr-FR" dirty="0"/>
-              <a:t>:</a:t>
+              <a:t>Objectifs :</a:t>
             </a:r>
           </a:p>
           <a:p>
-            <a:pPr marL="134269" indent="0">
+            <a:pPr lvl="1"/>
+            <a:r>
+              <a:rPr lang="fr-FR" dirty="0" smtClean="0">
+                <a:solidFill>
+                  <a:srgbClr val="242A75"/>
+                </a:solidFill>
+              </a:rPr>
+              <a:t>Création de lignes de commandes (</a:t>
+            </a:r>
+            <a:r>
+              <a:rPr lang="fr-FR" dirty="0" err="1" smtClean="0">
+                <a:solidFill>
+                  <a:srgbClr val="242A75"/>
+                </a:solidFill>
+              </a:rPr>
+              <a:t>create</a:t>
+            </a:r>
+            <a:r>
+              <a:rPr lang="fr-FR" dirty="0" smtClean="0">
+                <a:solidFill>
+                  <a:srgbClr val="242A75"/>
+                </a:solidFill>
+              </a:rPr>
+              <a:t>, </a:t>
+            </a:r>
+            <a:r>
+              <a:rPr lang="fr-FR" dirty="0" err="1" smtClean="0">
+                <a:solidFill>
+                  <a:srgbClr val="242A75"/>
+                </a:solidFill>
+              </a:rPr>
+              <a:t>delete</a:t>
+            </a:r>
+            <a:r>
+              <a:rPr lang="fr-FR" dirty="0" smtClean="0">
+                <a:solidFill>
+                  <a:srgbClr val="242A75"/>
+                </a:solidFill>
+              </a:rPr>
+              <a:t>, </a:t>
+            </a:r>
+            <a:r>
+              <a:rPr lang="fr-FR" dirty="0" err="1" smtClean="0">
+                <a:solidFill>
+                  <a:srgbClr val="242A75"/>
+                </a:solidFill>
+              </a:rPr>
+              <a:t>modify</a:t>
+            </a:r>
+            <a:r>
+              <a:rPr lang="fr-FR" dirty="0" smtClean="0">
+                <a:solidFill>
+                  <a:srgbClr val="242A75"/>
+                </a:solidFill>
+              </a:rPr>
+              <a:t>, </a:t>
+            </a:r>
+            <a:r>
+              <a:rPr lang="fr-FR" dirty="0" err="1" smtClean="0">
+                <a:solidFill>
+                  <a:srgbClr val="242A75"/>
+                </a:solidFill>
+              </a:rPr>
+              <a:t>list</a:t>
+            </a:r>
+            <a:r>
+              <a:rPr lang="fr-FR" dirty="0" smtClean="0">
+                <a:solidFill>
+                  <a:srgbClr val="242A75"/>
+                </a:solidFill>
+              </a:rPr>
+              <a:t>, display) pour modèle </a:t>
+            </a:r>
+            <a:r>
+              <a:rPr lang="fr-FR" dirty="0" err="1" smtClean="0">
+                <a:solidFill>
+                  <a:srgbClr val="242A75"/>
+                </a:solidFill>
+              </a:rPr>
+              <a:t>project</a:t>
+            </a:r>
+            <a:r>
+              <a:rPr lang="fr-FR" dirty="0" smtClean="0">
+                <a:solidFill>
+                  <a:srgbClr val="242A75"/>
+                </a:solidFill>
+              </a:rPr>
+              <a:t> et user story</a:t>
+            </a:r>
+          </a:p>
+          <a:p>
+            <a:pPr marL="268288" lvl="1" indent="0">
               <a:buNone/>
             </a:pPr>
             <a:endParaRPr lang="fr-FR" dirty="0" smtClean="0"/>
@@ -19330,27 +19310,29 @@
                   <a:srgbClr val="008000"/>
                 </a:solidFill>
               </a:rPr>
-              <a:t>OK/KO</a:t>
+              <a:t>OK</a:t>
             </a:r>
+            <a:endParaRPr lang="fr-FR" dirty="0" smtClean="0">
+              <a:solidFill>
+                <a:srgbClr val="008000"/>
+              </a:solidFill>
+            </a:endParaRPr>
           </a:p>
           <a:p>
             <a:pPr lvl="1"/>
-            <a:r>
-              <a:rPr lang="fr-FR" dirty="0" err="1" smtClean="0">
-                <a:solidFill>
-                  <a:srgbClr val="008000"/>
-                </a:solidFill>
-              </a:rPr>
-              <a:t>Ressenti,satisfaction</a:t>
-            </a:r>
             <a:r>
               <a:rPr lang="fr-FR" dirty="0" smtClean="0">
                 <a:solidFill>
                   <a:srgbClr val="008000"/>
                 </a:solidFill>
               </a:rPr>
-              <a:t>, problématiques, état d’avancement si KO</a:t>
+              <a:t>9/10 lignes de commandes créées</a:t>
             </a:r>
+            <a:endParaRPr lang="fr-FR" dirty="0" smtClean="0">
+              <a:solidFill>
+                <a:srgbClr val="008000"/>
+              </a:solidFill>
+            </a:endParaRPr>
           </a:p>
           <a:p>
             <a:pPr lvl="1"/>
@@ -19390,174 +19372,26 @@
             <a:pPr lvl="1"/>
             <a:r>
               <a:rPr lang="fr-FR" dirty="0" smtClean="0"/>
-              <a:t>Perspectives suite à la réalisation de l’US</a:t>
+              <a:t>Modifier la méthode d’appel d’un projet (ID, </a:t>
             </a:r>
-          </a:p>
-        </p:txBody>
-      </p:sp>
-    </p:spTree>
-    <p:extLst>
-      <p:ext uri="{BB962C8B-B14F-4D97-AF65-F5344CB8AC3E}">
-        <p14:creationId xmlns:p14="http://schemas.microsoft.com/office/powerpoint/2010/main" val="2854332775"/>
-      </p:ext>
-    </p:extLst>
-  </p:cSld>
-  <p:clrMapOvr>
-    <a:masterClrMapping/>
-  </p:clrMapOvr>
-  <p:timing>
-    <p:tnLst>
-      <p:par>
-        <p:cTn id="1" dur="indefinite" restart="never" nodeType="tmRoot"/>
-      </p:par>
-    </p:tnLst>
-  </p:timing>
-</p:sld>
-</file>
-
-<file path=ppt/slides/slide15.xml><?xml version="1.0" encoding="utf-8"?>
-<p:sld xmlns:a="http://schemas.openxmlformats.org/drawingml/2006/main" xmlns:r="http://schemas.openxmlformats.org/officeDocument/2006/relationships" xmlns:p="http://schemas.openxmlformats.org/presentationml/2006/main">
-  <p:cSld>
-    <p:spTree>
-      <p:nvGrpSpPr>
-        <p:cNvPr id="1" name=""/>
-        <p:cNvGrpSpPr/>
-        <p:nvPr/>
-      </p:nvGrpSpPr>
-      <p:grpSpPr>
-        <a:xfrm>
-          <a:off x="0" y="0"/>
-          <a:ext cx="0" cy="0"/>
-          <a:chOff x="0" y="0"/>
-          <a:chExt cx="0" cy="0"/>
-        </a:xfrm>
-      </p:grpSpPr>
-      <p:sp>
-        <p:nvSpPr>
-          <p:cNvPr id="2" name="Titre 1"/>
-          <p:cNvSpPr>
-            <a:spLocks noGrp="1"/>
-          </p:cNvSpPr>
-          <p:nvPr>
-            <p:ph type="title"/>
-          </p:nvPr>
-        </p:nvSpPr>
-        <p:spPr/>
-        <p:txBody>
-          <a:bodyPr/>
-          <a:lstStyle/>
-          <a:p>
-            <a:pPr fontAlgn="b">
-              <a:lnSpc>
-                <a:spcPct val="100000"/>
-              </a:lnSpc>
-              <a:spcBef>
-                <a:spcPts val="0"/>
-              </a:spcBef>
-              <a:defRPr/>
-            </a:pPr>
             <a:r>
-              <a:rPr lang="fr-FR" dirty="0"/>
-              <a:t>US </a:t>
+              <a:rPr lang="fr-FR" dirty="0" err="1" smtClean="0"/>
+              <a:t>name</a:t>
             </a:r>
             <a:r>
               <a:rPr lang="fr-FR" dirty="0" smtClean="0"/>
-              <a:t>#4: </a:t>
-            </a:r>
-            <a:r>
-              <a:rPr lang="fr-FR" b="0" dirty="0">
-                <a:solidFill>
-                  <a:srgbClr val="000000"/>
-                </a:solidFill>
-                <a:latin typeface="Arial"/>
-              </a:rPr>
-              <a:t>Implémentation des fonctions d’interaction</a:t>
-            </a:r>
-          </a:p>
-        </p:txBody>
-      </p:sp>
-      <p:sp>
-        <p:nvSpPr>
-          <p:cNvPr id="3" name="Espace réservé du contenu 2"/>
-          <p:cNvSpPr>
-            <a:spLocks noGrp="1"/>
-          </p:cNvSpPr>
-          <p:nvPr>
-            <p:ph idx="1"/>
-          </p:nvPr>
-        </p:nvSpPr>
-        <p:spPr>
-          <a:ln>
-            <a:noFill/>
-          </a:ln>
-        </p:spPr>
-        <p:txBody>
-          <a:bodyPr>
-            <a:normAutofit/>
-          </a:bodyPr>
-          <a:lstStyle/>
-          <a:p>
-            <a:r>
-              <a:rPr lang="fr-FR" dirty="0" smtClean="0"/>
-              <a:t>Objectifs </a:t>
-            </a:r>
-            <a:r>
-              <a:rPr lang="fr-FR" dirty="0"/>
-              <a:t>:</a:t>
-            </a:r>
-          </a:p>
-          <a:p>
-            <a:endParaRPr lang="fr-FR" dirty="0" smtClean="0"/>
-          </a:p>
-          <a:p>
-            <a:r>
-              <a:rPr lang="fr-FR" dirty="0" smtClean="0"/>
-              <a:t>Résultat </a:t>
-            </a:r>
-            <a:r>
-              <a:rPr lang="fr-FR" dirty="0"/>
-              <a:t>à la fin du sprint : </a:t>
-            </a:r>
-            <a:r>
-              <a:rPr lang="fr-FR" dirty="0" smtClean="0">
-                <a:solidFill>
-                  <a:srgbClr val="008000"/>
-                </a:solidFill>
-              </a:rPr>
-              <a:t>OK/KO</a:t>
+              <a:t> ?)</a:t>
             </a:r>
           </a:p>
           <a:p>
             <a:pPr lvl="1"/>
             <a:r>
-              <a:rPr lang="fr-FR" dirty="0" err="1" smtClean="0">
-                <a:solidFill>
-                  <a:srgbClr val="008000"/>
-                </a:solidFill>
-              </a:rPr>
-              <a:t>Ressenti,satisfaction</a:t>
+              <a:rPr lang="fr-FR" dirty="0" smtClean="0"/>
+              <a:t>Ligne de commande de « </a:t>
             </a:r>
             <a:r>
-              <a:rPr lang="fr-FR" dirty="0" smtClean="0">
-                <a:solidFill>
-                  <a:srgbClr val="008000"/>
-                </a:solidFill>
-              </a:rPr>
-              <a:t>, problématiques, état d’avancement si KO</a:t>
-            </a:r>
-          </a:p>
-          <a:p>
-            <a:pPr lvl="1"/>
-            <a:endParaRPr lang="fr-FR" dirty="0" smtClean="0">
-              <a:solidFill>
-                <a:srgbClr val="008000"/>
-              </a:solidFill>
-            </a:endParaRPr>
-          </a:p>
-          <a:p>
-            <a:r>
               <a:rPr lang="fr-FR" dirty="0" err="1" smtClean="0"/>
-              <a:t>What</a:t>
+              <a:t>gitus</a:t>
             </a:r>
             <a:r>
               <a:rPr lang="fr-FR" dirty="0" smtClean="0"/>
@@ -19565,7 +19399,7 @@
             </a:r>
             <a:r>
               <a:rPr lang="fr-FR" dirty="0" err="1" smtClean="0"/>
-              <a:t>is</a:t>
+              <a:t>project</a:t>
             </a:r>
             <a:r>
               <a:rPr lang="fr-FR" dirty="0" smtClean="0"/>
@@ -19573,19 +19407,20 @@
             </a:r>
             <a:r>
               <a:rPr lang="fr-FR" dirty="0" err="1" smtClean="0"/>
-              <a:t>next</a:t>
+              <a:t>modify</a:t>
             </a:r>
             <a:r>
               <a:rPr lang="fr-FR" dirty="0" smtClean="0"/>
-              <a:t> </a:t>
+              <a:t> » à implémenter</a:t>
             </a:r>
           </a:p>
           <a:p>
             <a:pPr lvl="1"/>
             <a:r>
               <a:rPr lang="fr-FR" dirty="0" smtClean="0"/>
-              <a:t>Perspectives suite à la réalisation de l’US</a:t>
+              <a:t>Lier une user story à un projet à partir d’une user story</a:t>
             </a:r>
+            <a:endParaRPr lang="fr-FR" dirty="0" smtClean="0"/>
           </a:p>
         </p:txBody>
       </p:sp>
@@ -19609,7 +19444,7 @@
 </p:sld>
 </file>
 
-<file path=ppt/slides/slide16.xml><?xml version="1.0" encoding="utf-8"?>
+<file path=ppt/slides/slide15.xml><?xml version="1.0" encoding="utf-8"?>
 <p:sld xmlns:a="http://schemas.openxmlformats.org/drawingml/2006/main" xmlns:r="http://schemas.openxmlformats.org/officeDocument/2006/relationships" xmlns:p="http://schemas.openxmlformats.org/presentationml/2006/main">
   <p:cSld>
     <p:spTree>
@@ -19696,7 +19531,7 @@
 </p:sld>
 </file>
 
-<file path=ppt/slides/slide17.xml><?xml version="1.0" encoding="utf-8"?>
+<file path=ppt/slides/slide16.xml><?xml version="1.0" encoding="utf-8"?>
 <p:sld xmlns:a="http://schemas.openxmlformats.org/drawingml/2006/main" xmlns:r="http://schemas.openxmlformats.org/officeDocument/2006/relationships" xmlns:p="http://schemas.openxmlformats.org/presentationml/2006/main">
   <p:cSld>
     <p:spTree>
@@ -19767,17 +19602,8 @@
             </a:r>
             <a:r>
               <a:rPr lang="fr-FR" dirty="0" smtClean="0"/>
-              <a:t>onctionnalités de </a:t>
+              <a:t>onctionnalités de la release qui ont été développées dans le sprint</a:t>
             </a:r>
-            <a:r>
-              <a:rPr lang="fr-FR" dirty="0" smtClean="0"/>
-              <a:t>la release qui ont été développées dans le </a:t>
-            </a:r>
-            <a:r>
-              <a:rPr lang="fr-FR" dirty="0" smtClean="0"/>
-              <a:t>sprint</a:t>
-            </a:r>
-            <a:endParaRPr lang="fr-FR" dirty="0" smtClean="0"/>
           </a:p>
         </p:txBody>
       </p:sp>
@@ -19831,7 +19657,7 @@
 </p:sld>
 </file>
 
-<file path=ppt/slides/slide18.xml><?xml version="1.0" encoding="utf-8"?>
+<file path=ppt/slides/slide17.xml><?xml version="1.0" encoding="utf-8"?>
 <p:sld xmlns:a="http://schemas.openxmlformats.org/drawingml/2006/main" xmlns:r="http://schemas.openxmlformats.org/officeDocument/2006/relationships" xmlns:p="http://schemas.openxmlformats.org/presentationml/2006/main">
   <p:cSld>
     <p:spTree>
@@ -19918,7 +19744,7 @@
 </p:sld>
 </file>
 
-<file path=ppt/slides/slide19.xml><?xml version="1.0" encoding="utf-8"?>
+<file path=ppt/slides/slide18.xml><?xml version="1.0" encoding="utf-8"?>
 <p:sld xmlns:a="http://schemas.openxmlformats.org/drawingml/2006/main" xmlns:r="http://schemas.openxmlformats.org/officeDocument/2006/relationships" xmlns:p="http://schemas.openxmlformats.org/presentationml/2006/main">
   <p:cSld>
     <p:spTree>
@@ -20067,14 +19893,14 @@
           <p:nvPr>
             <p:extLst>
               <p:ext uri="{D42A27DB-BD31-4B8C-83A1-F6EECF244321}">
-                <p14:modId xmlns:p14="http://schemas.microsoft.com/office/powerpoint/2010/main" val="338673081"/>
+                <p14:modId xmlns:p14="http://schemas.microsoft.com/office/powerpoint/2010/main" val="1265025834"/>
               </p:ext>
             </p:extLst>
           </p:nvPr>
         </p:nvGraphicFramePr>
         <p:xfrm>
           <a:off x="467544" y="606425"/>
-          <a:ext cx="7992888" cy="4136868"/>
+          <a:ext cx="7992888" cy="4193593"/>
         </p:xfrm>
         <a:graphic>
           <a:graphicData uri="http://schemas.openxmlformats.org/drawingml/2006/table">
@@ -20475,18 +20301,6 @@
                         </a:rPr>
                         <a:t>Antoine a codé quasiment l’intégralité du soft seul</a:t>
                       </a:r>
-                      <a:endParaRPr kumimoji="0" lang="fr-FR" sz="1400" b="1" i="0" u="none" strike="noStrike" kern="1200" cap="none" normalizeH="0" baseline="0" dirty="0" smtClean="0">
-                        <a:ln>
-                          <a:noFill/>
-                        </a:ln>
-                        <a:solidFill>
-                          <a:srgbClr val="003366"/>
-                        </a:solidFill>
-                        <a:effectLst/>
-                        <a:latin typeface="Arial" charset="0"/>
-                        <a:ea typeface="+mn-ea"/>
-                        <a:cs typeface="Arial" charset="0"/>
-                      </a:endParaRPr>
                     </a:p>
                     <a:p>
                       <a:pPr marL="287338" marR="0" lvl="1" indent="-285750" algn="l" defTabSz="914400" rtl="0" eaLnBrk="0" fontAlgn="base" latinLnBrk="0" hangingPunct="0">
@@ -20521,7 +20335,58 @@
                           <a:ea typeface="+mn-ea"/>
                           <a:cs typeface="Arial" charset="0"/>
                         </a:rPr>
-                        <a:t>Difficultés à redéfinir les user stories et à donner des limites à ces tâches</a:t>
+                        <a:t>Difficultés à redéfinir les user stories et à donner des limites à ces </a:t>
+                      </a:r>
+                      <a:r>
+                        <a:rPr kumimoji="0" lang="fr-FR" sz="1400" b="1" i="0" u="none" strike="noStrike" kern="1200" cap="none" normalizeH="0" baseline="0" dirty="0" smtClean="0">
+                          <a:ln>
+                            <a:noFill/>
+                          </a:ln>
+                          <a:solidFill>
+                            <a:srgbClr val="003366"/>
+                          </a:solidFill>
+                          <a:effectLst/>
+                          <a:latin typeface="Arial" charset="0"/>
+                          <a:ea typeface="+mn-ea"/>
+                          <a:cs typeface="Arial" charset="0"/>
+                        </a:rPr>
+                        <a:t>tâches</a:t>
+                      </a:r>
+                    </a:p>
+                    <a:p>
+                      <a:pPr marL="287338" marR="0" lvl="1" indent="-285750" algn="l" defTabSz="914400" rtl="0" eaLnBrk="0" fontAlgn="base" latinLnBrk="0" hangingPunct="0">
+                        <a:lnSpc>
+                          <a:spcPct val="100000"/>
+                        </a:lnSpc>
+                        <a:spcBef>
+                          <a:spcPct val="40000"/>
+                        </a:spcBef>
+                        <a:spcAft>
+                          <a:spcPct val="0"/>
+                        </a:spcAft>
+                        <a:buClr>
+                          <a:srgbClr val="FF6600"/>
+                        </a:buClr>
+                        <a:buSzPct val="70000"/>
+                        <a:buFont typeface="Arial" pitchFamily="34" charset="0"/>
+                        <a:buChar char="•"/>
+                        <a:tabLst/>
+                        <a:defRPr/>
+                      </a:pPr>
+                      <a:r>
+                        <a:rPr kumimoji="0" lang="fr-FR" sz="1400" b="1" i="0" u="none" strike="noStrike" kern="1200" cap="none" normalizeH="0" baseline="0" dirty="0" smtClean="0">
+                          <a:ln>
+                            <a:noFill/>
+                          </a:ln>
+                          <a:solidFill>
+                            <a:srgbClr val="003366"/>
+                          </a:solidFill>
+                          <a:effectLst/>
+                          <a:latin typeface="Arial" charset="0"/>
+                          <a:ea typeface="+mn-ea"/>
+                          <a:cs typeface="Arial" charset="0"/>
+                        </a:rPr>
+                        <a:t>Emploi du temps différents, difficile de programmer des réunions entre nous</a:t>
                       </a:r>
                       <a:endParaRPr kumimoji="0" lang="fr-FR" sz="1400" b="1" i="0" u="none" strike="noStrike" kern="1200" cap="none" normalizeH="0" baseline="0" dirty="0" smtClean="0">
                         <a:ln>
@@ -20932,7 +20797,58 @@
                           <a:ea typeface="+mn-ea"/>
                           <a:cs typeface="Arial" charset="0"/>
                         </a:rPr>
-                        <a:t>Trouver du temps dans la semaine pour se réunir et/ou travailler en équipe</a:t>
+                        <a:t>Trouver du temps dans la semaine pour se réunir et/ou travailler en </a:t>
+                      </a:r>
+                      <a:r>
+                        <a:rPr kumimoji="0" lang="fr-FR" sz="1400" b="1" i="0" u="none" strike="noStrike" kern="1200" cap="none" normalizeH="0" baseline="0" dirty="0" smtClean="0">
+                          <a:ln>
+                            <a:noFill/>
+                          </a:ln>
+                          <a:solidFill>
+                            <a:srgbClr val="003366"/>
+                          </a:solidFill>
+                          <a:effectLst/>
+                          <a:latin typeface="Arial" charset="0"/>
+                          <a:ea typeface="+mn-ea"/>
+                          <a:cs typeface="Arial" charset="0"/>
+                        </a:rPr>
+                        <a:t>équipe</a:t>
+                      </a:r>
+                    </a:p>
+                    <a:p>
+                      <a:pPr marL="285750" marR="0" lvl="0" indent="-285750" algn="l" defTabSz="914400" rtl="0" eaLnBrk="0" fontAlgn="base" latinLnBrk="0" hangingPunct="0">
+                        <a:lnSpc>
+                          <a:spcPct val="100000"/>
+                        </a:lnSpc>
+                        <a:spcBef>
+                          <a:spcPct val="80000"/>
+                        </a:spcBef>
+                        <a:spcAft>
+                          <a:spcPct val="20000"/>
+                        </a:spcAft>
+                        <a:buClr>
+                          <a:srgbClr val="FF6600"/>
+                        </a:buClr>
+                        <a:buSzPct val="80000"/>
+                        <a:buFont typeface="Arial" panose="020B0604020202020204" pitchFamily="34" charset="0"/>
+                        <a:buChar char="•"/>
+                        <a:tabLst/>
+                        <a:defRPr/>
+                      </a:pPr>
+                      <a:r>
+                        <a:rPr kumimoji="0" lang="fr-FR" sz="1400" b="1" i="0" u="none" strike="noStrike" kern="1200" cap="none" normalizeH="0" baseline="0" dirty="0" smtClean="0">
+                          <a:ln>
+                            <a:noFill/>
+                          </a:ln>
+                          <a:solidFill>
+                            <a:srgbClr val="003366"/>
+                          </a:solidFill>
+                          <a:effectLst/>
+                          <a:latin typeface="Arial" charset="0"/>
+                          <a:ea typeface="+mn-ea"/>
+                          <a:cs typeface="Arial" charset="0"/>
+                        </a:rPr>
+                        <a:t>Se former au niveau d’Antoine pour que chaque membre soit indépendant</a:t>
                       </a:r>
                       <a:endParaRPr kumimoji="0" lang="fr-FR" sz="1400" b="1" i="0" u="none" strike="noStrike" kern="1200" cap="none" normalizeH="0" baseline="0" dirty="0" smtClean="0">
                         <a:ln>
@@ -21024,85 +20940,7 @@
 </p:sld>
 </file>
 
-<file path=ppt/slides/slide2.xml><?xml version="1.0" encoding="utf-8"?>
-<p:sld xmlns:a="http://schemas.openxmlformats.org/drawingml/2006/main" xmlns:r="http://schemas.openxmlformats.org/officeDocument/2006/relationships" xmlns:p="http://schemas.openxmlformats.org/presentationml/2006/main">
-  <p:cSld>
-    <p:spTree>
-      <p:nvGrpSpPr>
-        <p:cNvPr id="1" name=""/>
-        <p:cNvGrpSpPr/>
-        <p:nvPr/>
-      </p:nvGrpSpPr>
-      <p:grpSpPr>
-        <a:xfrm>
-          <a:off x="0" y="0"/>
-          <a:ext cx="0" cy="0"/>
-          <a:chOff x="0" y="0"/>
-          <a:chExt cx="0" cy="0"/>
-        </a:xfrm>
-      </p:grpSpPr>
-      <p:sp>
-        <p:nvSpPr>
-          <p:cNvPr id="2" name="Titre 1"/>
-          <p:cNvSpPr>
-            <a:spLocks noGrp="1"/>
-          </p:cNvSpPr>
-          <p:nvPr>
-            <p:ph type="ctrTitle"/>
-          </p:nvPr>
-        </p:nvSpPr>
-        <p:spPr/>
-        <p:txBody>
-          <a:bodyPr/>
-          <a:lstStyle/>
-          <a:p>
-            <a:r>
-              <a:rPr lang="fr-FR" dirty="0"/>
-              <a:t>Planification générale</a:t>
-            </a:r>
-          </a:p>
-        </p:txBody>
-      </p:sp>
-      <p:sp>
-        <p:nvSpPr>
-          <p:cNvPr id="3" name="Sous-titre 2"/>
-          <p:cNvSpPr>
-            <a:spLocks noGrp="1"/>
-          </p:cNvSpPr>
-          <p:nvPr>
-            <p:ph type="subTitle" idx="1"/>
-          </p:nvPr>
-        </p:nvSpPr>
-        <p:spPr/>
-        <p:txBody>
-          <a:bodyPr/>
-          <a:lstStyle/>
-          <a:p>
-            <a:endParaRPr lang="fr-FR" dirty="0"/>
-          </a:p>
-        </p:txBody>
-      </p:sp>
-    </p:spTree>
-    <p:extLst>
-      <p:ext uri="{BB962C8B-B14F-4D97-AF65-F5344CB8AC3E}">
-        <p14:creationId xmlns:p14="http://schemas.microsoft.com/office/powerpoint/2010/main" val="2246462537"/>
-      </p:ext>
-    </p:extLst>
-  </p:cSld>
-  <p:clrMapOvr>
-    <a:masterClrMapping/>
-  </p:clrMapOvr>
-  <p:timing>
-    <p:tnLst>
-      <p:par>
-        <p:cTn id="1" dur="indefinite" restart="never" nodeType="tmRoot"/>
-      </p:par>
-    </p:tnLst>
-  </p:timing>
-</p:sld>
-</file>
-
-<file path=ppt/slides/slide20.xml><?xml version="1.0" encoding="utf-8"?>
+<file path=ppt/slides/slide19.xml><?xml version="1.0" encoding="utf-8"?>
 <p:sld xmlns:a="http://schemas.openxmlformats.org/drawingml/2006/main" xmlns:r="http://schemas.openxmlformats.org/officeDocument/2006/relationships" xmlns:p="http://schemas.openxmlformats.org/presentationml/2006/main">
   <p:cSld>
     <p:spTree>
@@ -21361,6 +21199,72 @@
           </a:p>
         </p:txBody>
       </p:sp>
+      <p:sp>
+        <p:nvSpPr>
+          <p:cNvPr id="6" name="Titre 1"/>
+          <p:cNvSpPr txBox="1">
+            <a:spLocks/>
+          </p:cNvSpPr>
+          <p:nvPr/>
+        </p:nvSpPr>
+        <p:spPr>
+          <a:xfrm rot="19932771">
+            <a:off x="251520" y="2499742"/>
+            <a:ext cx="8674683" cy="561836"/>
+          </a:xfrm>
+          <a:prstGeom prst="rect">
+            <a:avLst/>
+          </a:prstGeom>
+        </p:spPr>
+        <p:txBody>
+          <a:bodyPr vert="horz" lIns="91440" tIns="45720" rIns="91440" bIns="45720" rtlCol="0" anchor="ctr">
+            <a:noAutofit/>
+          </a:bodyPr>
+          <a:lstStyle>
+            <a:lvl1pPr algn="l" defTabSz="342900" rtl="0" eaLnBrk="1" latinLnBrk="0" hangingPunct="1">
+              <a:lnSpc>
+                <a:spcPct val="90000"/>
+              </a:lnSpc>
+              <a:spcBef>
+                <a:spcPct val="0"/>
+              </a:spcBef>
+              <a:buNone/>
+              <a:defRPr sz="2000" b="1" kern="1200">
+                <a:solidFill>
+                  <a:schemeClr val="tx1"/>
+                </a:solidFill>
+                <a:latin typeface="+mj-lt"/>
+                <a:ea typeface="+mj-ea"/>
+                <a:cs typeface="+mj-cs"/>
+              </a:defRPr>
+            </a:lvl1pPr>
+          </a:lstStyle>
+          <a:p>
+            <a:pPr algn="ctr"/>
+            <a:r>
+              <a:rPr lang="fr-FR" dirty="0" smtClean="0">
+                <a:solidFill>
+                  <a:srgbClr val="FF0000"/>
+                </a:solidFill>
+              </a:rPr>
+              <a:t>A </a:t>
+            </a:r>
+            <a:r>
+              <a:rPr lang="fr-FR" dirty="0" smtClean="0">
+                <a:solidFill>
+                  <a:srgbClr val="FF0000"/>
+                </a:solidFill>
+              </a:rPr>
+              <a:t>mettre à jour pour les sprints à venir</a:t>
+            </a:r>
+            <a:endParaRPr lang="fr-FR" dirty="0">
+              <a:solidFill>
+                <a:srgbClr val="FF0000"/>
+              </a:solidFill>
+            </a:endParaRPr>
+          </a:p>
+        </p:txBody>
+      </p:sp>
     </p:spTree>
     <p:extLst>
       <p:ext uri="{BB962C8B-B14F-4D97-AF65-F5344CB8AC3E}">
@@ -21381,7 +21285,85 @@
 </p:sld>
 </file>
 
-<file path=ppt/slides/slide21.xml><?xml version="1.0" encoding="utf-8"?>
+<file path=ppt/slides/slide2.xml><?xml version="1.0" encoding="utf-8"?>
+<p:sld xmlns:a="http://schemas.openxmlformats.org/drawingml/2006/main" xmlns:r="http://schemas.openxmlformats.org/officeDocument/2006/relationships" xmlns:p="http://schemas.openxmlformats.org/presentationml/2006/main">
+  <p:cSld>
+    <p:spTree>
+      <p:nvGrpSpPr>
+        <p:cNvPr id="1" name=""/>
+        <p:cNvGrpSpPr/>
+        <p:nvPr/>
+      </p:nvGrpSpPr>
+      <p:grpSpPr>
+        <a:xfrm>
+          <a:off x="0" y="0"/>
+          <a:ext cx="0" cy="0"/>
+          <a:chOff x="0" y="0"/>
+          <a:chExt cx="0" cy="0"/>
+        </a:xfrm>
+      </p:grpSpPr>
+      <p:sp>
+        <p:nvSpPr>
+          <p:cNvPr id="2" name="Titre 1"/>
+          <p:cNvSpPr>
+            <a:spLocks noGrp="1"/>
+          </p:cNvSpPr>
+          <p:nvPr>
+            <p:ph type="ctrTitle"/>
+          </p:nvPr>
+        </p:nvSpPr>
+        <p:spPr/>
+        <p:txBody>
+          <a:bodyPr/>
+          <a:lstStyle/>
+          <a:p>
+            <a:r>
+              <a:rPr lang="fr-FR" dirty="0"/>
+              <a:t>Planification générale</a:t>
+            </a:r>
+          </a:p>
+        </p:txBody>
+      </p:sp>
+      <p:sp>
+        <p:nvSpPr>
+          <p:cNvPr id="3" name="Sous-titre 2"/>
+          <p:cNvSpPr>
+            <a:spLocks noGrp="1"/>
+          </p:cNvSpPr>
+          <p:nvPr>
+            <p:ph type="subTitle" idx="1"/>
+          </p:nvPr>
+        </p:nvSpPr>
+        <p:spPr/>
+        <p:txBody>
+          <a:bodyPr/>
+          <a:lstStyle/>
+          <a:p>
+            <a:endParaRPr lang="fr-FR" dirty="0"/>
+          </a:p>
+        </p:txBody>
+      </p:sp>
+    </p:spTree>
+    <p:extLst>
+      <p:ext uri="{BB962C8B-B14F-4D97-AF65-F5344CB8AC3E}">
+        <p14:creationId xmlns:p14="http://schemas.microsoft.com/office/powerpoint/2010/main" val="2246462537"/>
+      </p:ext>
+    </p:extLst>
+  </p:cSld>
+  <p:clrMapOvr>
+    <a:masterClrMapping/>
+  </p:clrMapOvr>
+  <p:timing>
+    <p:tnLst>
+      <p:par>
+        <p:cTn id="1" dur="indefinite" restart="never" nodeType="tmRoot"/>
+      </p:par>
+    </p:tnLst>
+  </p:timing>
+</p:sld>
+</file>
+
+<file path=ppt/slides/slide20.xml><?xml version="1.0" encoding="utf-8"?>
 <p:sld xmlns:a="http://schemas.openxmlformats.org/drawingml/2006/main" xmlns:r="http://schemas.openxmlformats.org/officeDocument/2006/relationships" xmlns:p="http://schemas.openxmlformats.org/presentationml/2006/main">
   <p:cSld>
     <p:spTree>
@@ -21468,7 +21450,7 @@
 </p:sld>
 </file>
 
-<file path=ppt/slides/slide22.xml><?xml version="1.0" encoding="utf-8"?>
+<file path=ppt/slides/slide21.xml><?xml version="1.0" encoding="utf-8"?>
 <p:sld xmlns:a="http://schemas.openxmlformats.org/drawingml/2006/main" xmlns:r="http://schemas.openxmlformats.org/officeDocument/2006/relationships" xmlns:p="http://schemas.openxmlformats.org/presentationml/2006/main">
   <p:cSld>
     <p:spTree>
@@ -21608,6 +21590,136 @@
           </a:p>
         </p:txBody>
       </p:sp>
+      <p:sp>
+        <p:nvSpPr>
+          <p:cNvPr id="6" name="Rectangle 5"/>
+          <p:cNvSpPr/>
+          <p:nvPr/>
+        </p:nvSpPr>
+        <p:spPr>
+          <a:xfrm>
+            <a:off x="251520" y="987574"/>
+            <a:ext cx="6480720" cy="1564531"/>
+          </a:xfrm>
+          <a:prstGeom prst="rect">
+            <a:avLst/>
+          </a:prstGeom>
+        </p:spPr>
+        <p:txBody>
+          <a:bodyPr wrap="square">
+            <a:spAutoFit/>
+          </a:bodyPr>
+          <a:lstStyle/>
+          <a:p>
+            <a:pPr marL="270000" lvl="0" indent="-135731" defTabSz="342900">
+              <a:spcBef>
+                <a:spcPts val="450"/>
+              </a:spcBef>
+              <a:spcAft>
+                <a:spcPts val="525"/>
+              </a:spcAft>
+              <a:buClr>
+                <a:srgbClr val="309DB5"/>
+              </a:buClr>
+              <a:buSzPct val="90000"/>
+              <a:buFont typeface="Century Gothic" panose="020B0502020202020204" pitchFamily="34" charset="0"/>
+              <a:buChar char="▌"/>
+              <a:tabLst>
+                <a:tab pos="739379" algn="l"/>
+              </a:tabLst>
+            </a:pPr>
+            <a:r>
+              <a:rPr lang="fr-FR" b="1" dirty="0" smtClean="0">
+                <a:solidFill>
+                  <a:srgbClr val="309DB5"/>
+                </a:solidFill>
+              </a:rPr>
+              <a:t>Piste de nouvelles fonctionnalités à implémenter pour le prochain sprint :</a:t>
+            </a:r>
+          </a:p>
+          <a:p>
+            <a:pPr marL="452438" lvl="1" indent="-184150" defTabSz="342900">
+              <a:spcBef>
+                <a:spcPts val="225"/>
+              </a:spcBef>
+              <a:spcAft>
+                <a:spcPts val="450"/>
+              </a:spcAft>
+              <a:buSzPct val="100000"/>
+              <a:buBlip>
+                <a:blip r:embed="rId2"/>
+              </a:buBlip>
+            </a:pPr>
+            <a:r>
+              <a:rPr lang="fr-FR" sz="1600" dirty="0" smtClean="0">
+                <a:solidFill>
+                  <a:srgbClr val="242A75"/>
+                </a:solidFill>
+              </a:rPr>
+              <a:t>Connexion à la base de données via un fichier de configuration (Librairie </a:t>
+            </a:r>
+            <a:r>
+              <a:rPr lang="fr-FR" sz="1600" dirty="0" err="1" smtClean="0">
+                <a:solidFill>
+                  <a:srgbClr val="242A75"/>
+                </a:solidFill>
+              </a:rPr>
+              <a:t>golang</a:t>
+            </a:r>
+            <a:r>
+              <a:rPr lang="fr-FR" sz="1600" dirty="0" smtClean="0">
+                <a:solidFill>
+                  <a:srgbClr val="242A75"/>
+                </a:solidFill>
+              </a:rPr>
+              <a:t> </a:t>
+            </a:r>
+            <a:r>
+              <a:rPr lang="fr-FR" sz="1600" dirty="0" err="1" smtClean="0">
+                <a:solidFill>
+                  <a:srgbClr val="242A75"/>
+                </a:solidFill>
+              </a:rPr>
+              <a:t>Viper</a:t>
+            </a:r>
+            <a:r>
+              <a:rPr lang="fr-FR" sz="1600" dirty="0" smtClean="0">
+                <a:solidFill>
+                  <a:srgbClr val="242A75"/>
+                </a:solidFill>
+              </a:rPr>
+              <a:t>)</a:t>
+            </a:r>
+          </a:p>
+          <a:p>
+            <a:pPr marL="452438" lvl="1" indent="-184150" defTabSz="342900">
+              <a:spcBef>
+                <a:spcPts val="225"/>
+              </a:spcBef>
+              <a:spcAft>
+                <a:spcPts val="450"/>
+              </a:spcAft>
+              <a:buSzPct val="100000"/>
+              <a:buBlip>
+                <a:blip r:embed="rId2"/>
+              </a:buBlip>
+            </a:pPr>
+            <a:r>
+              <a:rPr lang="fr-FR" sz="1600" dirty="0" smtClean="0">
+                <a:solidFill>
+                  <a:srgbClr val="242A75"/>
+                </a:solidFill>
+              </a:rPr>
+              <a:t>Intégrer tâche dans le modèle (fonctions CLI)</a:t>
+            </a:r>
+            <a:endParaRPr lang="fr-FR" sz="1600" dirty="0">
+              <a:solidFill>
+                <a:srgbClr val="242A75"/>
+              </a:solidFill>
+            </a:endParaRPr>
+          </a:p>
+        </p:txBody>
+      </p:sp>
     </p:spTree>
     <p:extLst>
       <p:ext uri="{BB962C8B-B14F-4D97-AF65-F5344CB8AC3E}">
@@ -21628,7 +21740,7 @@
 </p:sld>
 </file>
 
-<file path=ppt/slides/slide23.xml><?xml version="1.0" encoding="utf-8"?>
+<file path=ppt/slides/slide22.xml><?xml version="1.0" encoding="utf-8"?>
 <p:sld xmlns:a="http://schemas.openxmlformats.org/drawingml/2006/main" xmlns:r="http://schemas.openxmlformats.org/officeDocument/2006/relationships" xmlns:p="http://schemas.openxmlformats.org/presentationml/2006/main">
   <p:cSld>
     <p:spTree>
@@ -22834,7 +22946,7 @@
 </p:sld>
 </file>
 
-<file path=ppt/slides/slide24.xml><?xml version="1.0" encoding="utf-8"?>
+<file path=ppt/slides/slide23.xml><?xml version="1.0" encoding="utf-8"?>
 <p:sld xmlns:a="http://schemas.openxmlformats.org/drawingml/2006/main" xmlns:r="http://schemas.openxmlformats.org/officeDocument/2006/relationships" xmlns:p="http://schemas.openxmlformats.org/presentationml/2006/main">
   <p:cSld>
     <p:spTree>
@@ -22893,41 +23005,6 @@
                 <a:spcPct val="150000"/>
               </a:lnSpc>
             </a:pPr>
-            <a:r>
-              <a:rPr lang="fr-FR" dirty="0" smtClean="0"/>
-              <a:t>Ex : priorisation des </a:t>
-            </a:r>
-            <a:r>
-              <a:rPr lang="fr-FR" dirty="0" err="1" smtClean="0"/>
-              <a:t>epics</a:t>
-            </a:r>
-            <a:r>
-              <a:rPr lang="fr-FR" dirty="0" smtClean="0"/>
-              <a:t> avec </a:t>
-            </a:r>
-            <a:r>
-              <a:rPr lang="fr-FR" dirty="0" err="1" smtClean="0"/>
-              <a:t>stake</a:t>
-            </a:r>
-            <a:r>
-              <a:rPr lang="fr-FR" dirty="0" smtClean="0"/>
-              <a:t> </a:t>
-            </a:r>
-            <a:r>
-              <a:rPr lang="fr-FR" dirty="0" err="1" smtClean="0"/>
-              <a:t>holders</a:t>
-            </a:r>
-            <a:r>
-              <a:rPr lang="fr-FR" dirty="0" smtClean="0"/>
-              <a:t>/po</a:t>
-            </a:r>
-          </a:p>
-          <a:p>
-            <a:pPr>
-              <a:lnSpc>
-                <a:spcPct val="150000"/>
-              </a:lnSpc>
-            </a:pPr>
             <a:endParaRPr lang="fr-FR" dirty="0"/>
           </a:p>
           <a:p>
@@ -22958,7 +23035,7 @@
 </p:sld>
 </file>
 
-<file path=ppt/slides/slide25.xml><?xml version="1.0" encoding="utf-8"?>
+<file path=ppt/slides/slide24.xml><?xml version="1.0" encoding="utf-8"?>
 <p:sld xmlns:a="http://schemas.openxmlformats.org/drawingml/2006/main" xmlns:r="http://schemas.openxmlformats.org/officeDocument/2006/relationships" xmlns:p="http://schemas.openxmlformats.org/presentationml/2006/main">
   <p:cSld>
     <p:spTree>
@@ -23037,7 +23114,7 @@
 </p:sld>
 </file>
 
-<file path=ppt/slides/slide26.xml><?xml version="1.0" encoding="utf-8"?>
+<file path=ppt/slides/slide25.xml><?xml version="1.0" encoding="utf-8"?>
 <p:sld xmlns:a="http://schemas.openxmlformats.org/drawingml/2006/main" xmlns:r="http://schemas.openxmlformats.org/officeDocument/2006/relationships" xmlns:p="http://schemas.openxmlformats.org/presentationml/2006/main">
   <p:cSld>
     <p:spTree>
@@ -23270,7 +23347,7 @@
             <p:ph idx="1"/>
             <p:extLst>
               <p:ext uri="{D42A27DB-BD31-4B8C-83A1-F6EECF244321}">
-                <p14:modId xmlns:p14="http://schemas.microsoft.com/office/powerpoint/2010/main" val="1618999838"/>
+                <p14:modId xmlns:p14="http://schemas.microsoft.com/office/powerpoint/2010/main" val="1677942691"/>
               </p:ext>
             </p:extLst>
           </p:nvPr>
@@ -23730,11 +23807,7 @@
             </a:pPr>
             <a:r>
               <a:rPr lang="fr-FR" sz="1400" dirty="0" smtClean="0"/>
-              <a:t>Schéma </a:t>
-            </a:r>
-            <a:r>
-              <a:rPr lang="fr-FR" sz="1400" dirty="0" smtClean="0"/>
-              <a:t>de fonctionnement à la fin de la release</a:t>
+              <a:t>Schéma de fonctionnement à la fin de la release</a:t>
             </a:r>
           </a:p>
         </p:txBody>
@@ -23879,7 +23952,6 @@
               <a:rPr lang="fr-FR" dirty="0" smtClean="0"/>
               <a:t> grâce à l’interface CLI</a:t>
             </a:r>
-            <a:endParaRPr lang="fr-FR" dirty="0" smtClean="0"/>
           </a:p>
           <a:p>
             <a:pPr lvl="2"/>

</xml_diff>